<commit_message>
Poznámky k Qsort a BMA (čas. složitost)
</commit_message>
<xml_diff>
--- a/Planning/IFJ_obhajoba.pptx
+++ b/Planning/IFJ_obhajoba.pptx
@@ -116,6 +116,22 @@
       </a:defRPr>
     </a:lvl9pPr>
   </p:defaultTextStyle>
+  <p:extLst>
+    <p:ext uri="{EFAFB233-063F-42B5-8137-9DF3F51BA10A}">
+      <p15:sldGuideLst xmlns:p15="http://schemas.microsoft.com/office/powerpoint/2012/main">
+        <p15:guide id="1" orient="horz" pos="2160">
+          <p15:clr>
+            <a:srgbClr val="A4A3A4"/>
+          </p15:clr>
+        </p15:guide>
+        <p15:guide id="2" pos="2880">
+          <p15:clr>
+            <a:srgbClr val="A4A3A4"/>
+          </p15:clr>
+        </p15:guide>
+      </p15:sldGuideLst>
+    </p:ext>
+  </p:extLst>
 </p:presentation>
 </file>
 
@@ -201,7 +217,7 @@
           <a:p>
             <a:fld id="{5F7241FA-AE09-4A15-8466-688245892F74}" type="datetimeFigureOut">
               <a:rPr lang="cs-CZ" smtClean="0"/>
-              <a:t>13.12.2016</a:t>
+              <a:t>14.12.2016</a:t>
             </a:fld>
             <a:endParaRPr lang="cs-CZ"/>
           </a:p>
@@ -1374,8 +1390,128 @@
             </a:r>
             <a:r>
               <a:rPr lang="cs-CZ" baseline="0" dirty="0" smtClean="0"/>
-              <a:t> (od posledního znaku).</a:t>
-            </a:r>
+              <a:t> (od posledního znaku</a:t>
+            </a:r>
+            <a:r>
+              <a:rPr lang="cs-CZ" baseline="0" dirty="0" smtClean="0"/>
+              <a:t>).</a:t>
+            </a:r>
+          </a:p>
+          <a:p>
+            <a:r>
+              <a:rPr lang="cs-CZ" sz="1200" kern="1200" dirty="0" smtClean="0">
+                <a:solidFill>
+                  <a:schemeClr val="tx1"/>
+                </a:solidFill>
+                <a:effectLst/>
+                <a:latin typeface="+mn-lt"/>
+                <a:ea typeface="+mn-ea"/>
+                <a:cs typeface="+mn-cs"/>
+              </a:rPr>
+              <a:t>Chování BMA závisí na kardinalitě abecedy (kardinalita</a:t>
+            </a:r>
+            <a:r>
+              <a:rPr lang="cs-CZ" sz="1200" kern="1200" baseline="0" dirty="0" smtClean="0">
+                <a:solidFill>
+                  <a:schemeClr val="tx1"/>
+                </a:solidFill>
+                <a:effectLst/>
+                <a:latin typeface="+mn-lt"/>
+                <a:ea typeface="+mn-ea"/>
+                <a:cs typeface="+mn-cs"/>
+              </a:rPr>
+              <a:t> = mohutnost = počet prvků množiny. AJ abeceda má </a:t>
+            </a:r>
+            <a:r>
+              <a:rPr lang="cs-CZ" dirty="0" smtClean="0"/>
+              <a:t>26 písmen tedy kardinalitu 26)</a:t>
+            </a:r>
+            <a:r>
+              <a:rPr lang="cs-CZ" sz="1200" kern="1200" dirty="0" smtClean="0">
+                <a:solidFill>
+                  <a:schemeClr val="tx1"/>
+                </a:solidFill>
+                <a:effectLst/>
+                <a:latin typeface="+mn-lt"/>
+                <a:ea typeface="+mn-ea"/>
+                <a:cs typeface="+mn-cs"/>
+              </a:rPr>
+              <a:t> a na opakování podřetězců ve vzorku(toto</a:t>
+            </a:r>
+            <a:r>
+              <a:rPr lang="cs-CZ" sz="1200" kern="1200" baseline="0" dirty="0" smtClean="0">
+                <a:solidFill>
+                  <a:schemeClr val="tx1"/>
+                </a:solidFill>
+                <a:effectLst/>
+                <a:latin typeface="+mn-lt"/>
+                <a:ea typeface="+mn-ea"/>
+                <a:cs typeface="+mn-cs"/>
+              </a:rPr>
+              <a:t> platí spíše pro 2. heuristiku kterou jste nedělali – ta počítá skoky na základě řetězců, ne písmen jako 1. </a:t>
+            </a:r>
+            <a:r>
+              <a:rPr lang="cs-CZ" sz="1200" kern="1200" baseline="0" smtClean="0">
+                <a:solidFill>
+                  <a:schemeClr val="tx1"/>
+                </a:solidFill>
+                <a:effectLst/>
+                <a:latin typeface="+mn-lt"/>
+                <a:ea typeface="+mn-ea"/>
+                <a:cs typeface="+mn-cs"/>
+              </a:rPr>
+              <a:t>h.)</a:t>
+            </a:r>
+            <a:r>
+              <a:rPr lang="cs-CZ" sz="1200" kern="1200" smtClean="0">
+                <a:solidFill>
+                  <a:schemeClr val="tx1"/>
+                </a:solidFill>
+                <a:effectLst/>
+                <a:latin typeface="+mn-lt"/>
+                <a:ea typeface="+mn-ea"/>
+                <a:cs typeface="+mn-cs"/>
+              </a:rPr>
+              <a:t>. </a:t>
+            </a:r>
+            <a:r>
+              <a:rPr lang="cs-CZ" sz="1200" kern="1200" dirty="0" smtClean="0">
+                <a:solidFill>
+                  <a:schemeClr val="tx1"/>
+                </a:solidFill>
+                <a:effectLst/>
+                <a:latin typeface="+mn-lt"/>
+                <a:ea typeface="+mn-ea"/>
+                <a:cs typeface="+mn-cs"/>
+              </a:rPr>
+              <a:t>Empirické studie s hovorovým jazykem ukázaly, že pro délku vzorku m&gt;5 provádí algoritmus přibližně 0.24 až 0.3 porovnání z počtu znaků v prohledávaném textu. Jinými slovy, porovnává asi jednu čtvrtinu až jednu třetinu znaků prohledávaného textu.</a:t>
+            </a:r>
+            <a:r>
+              <a:rPr lang="cs-CZ" sz="1200" kern="1200" baseline="0" dirty="0" smtClean="0">
+                <a:solidFill>
+                  <a:schemeClr val="tx1"/>
+                </a:solidFill>
+                <a:effectLst/>
+                <a:latin typeface="+mn-lt"/>
+                <a:ea typeface="+mn-ea"/>
+                <a:cs typeface="+mn-cs"/>
+              </a:rPr>
+              <a:t> </a:t>
+            </a:r>
+            <a:r>
+              <a:rPr lang="cs-CZ" sz="1200" kern="1200" dirty="0" smtClean="0">
+                <a:solidFill>
+                  <a:schemeClr val="tx1"/>
+                </a:solidFill>
+                <a:effectLst/>
+                <a:latin typeface="+mn-lt"/>
+                <a:ea typeface="+mn-ea"/>
+                <a:cs typeface="+mn-cs"/>
+              </a:rPr>
+              <a:t>BMA patří k velmi efektivním algoritmům pro vyhledávání podřetězců v řetězcích</a:t>
+            </a:r>
+          </a:p>
+          <a:p>
             <a:endParaRPr lang="cs-CZ" dirty="0"/>
           </a:p>
         </p:txBody>
@@ -1462,7 +1598,115 @@
           <a:p>
             <a:r>
               <a:rPr lang="cs-CZ" dirty="0" smtClean="0"/>
-              <a:t>Dalším algoritmem, který jsme měli implementovat byl </a:t>
+              <a:t>!!! Asymptotická časová složitost je </a:t>
+            </a:r>
+            <a:r>
+              <a:rPr lang="cs-CZ" dirty="0" err="1" smtClean="0"/>
+              <a:t>linearitmická</a:t>
+            </a:r>
+            <a:r>
+              <a:rPr lang="cs-CZ" dirty="0" smtClean="0"/>
+              <a:t> (průměrná</a:t>
+            </a:r>
+            <a:r>
+              <a:rPr lang="cs-CZ" baseline="0" dirty="0" smtClean="0"/>
+              <a:t> čas. Složitost je </a:t>
+            </a:r>
+            <a:r>
+              <a:rPr lang="cs-CZ" sz="1200" kern="1200" dirty="0" smtClean="0">
+                <a:solidFill>
+                  <a:schemeClr val="tx1"/>
+                </a:solidFill>
+                <a:effectLst/>
+                <a:latin typeface="+mn-lt"/>
+                <a:ea typeface="+mn-ea"/>
+                <a:cs typeface="+mn-cs"/>
+              </a:rPr>
+              <a:t>17*n*lg2(n) </a:t>
+            </a:r>
+            <a:r>
+              <a:rPr lang="cs-CZ" dirty="0" smtClean="0"/>
+              <a:t>!!! </a:t>
+            </a:r>
+            <a:r>
+              <a:rPr lang="cs-CZ" dirty="0" err="1" smtClean="0"/>
+              <a:t>Quicksort</a:t>
+            </a:r>
+            <a:r>
+              <a:rPr lang="cs-CZ" dirty="0" smtClean="0"/>
+              <a:t> je nestabilní(nezachová relativní</a:t>
+            </a:r>
+            <a:r>
+              <a:rPr lang="cs-CZ" baseline="0" dirty="0" smtClean="0"/>
+              <a:t> pořadí prvků se stejným klíčem)</a:t>
+            </a:r>
+            <a:r>
+              <a:rPr lang="cs-CZ" dirty="0" smtClean="0"/>
+              <a:t> a nepracuje přirozeně (přirozený algoritmus = čas na</a:t>
+            </a:r>
+            <a:r>
+              <a:rPr lang="cs-CZ" baseline="0" dirty="0" smtClean="0"/>
+              <a:t> seřazení již seřazeného pole(od min po </a:t>
+            </a:r>
+            <a:r>
+              <a:rPr lang="cs-CZ" baseline="0" dirty="0" err="1" smtClean="0"/>
+              <a:t>max</a:t>
+            </a:r>
+            <a:r>
+              <a:rPr lang="cs-CZ" baseline="0" dirty="0" smtClean="0"/>
+              <a:t>)</a:t>
+            </a:r>
+            <a:r>
+              <a:rPr lang="cs-CZ" dirty="0" smtClean="0"/>
+              <a:t> &lt;</a:t>
+            </a:r>
+            <a:r>
+              <a:rPr lang="cs-CZ" baseline="0" dirty="0" smtClean="0"/>
+              <a:t> </a:t>
+            </a:r>
+            <a:r>
+              <a:rPr lang="cs-CZ" dirty="0" smtClean="0"/>
+              <a:t>čas na</a:t>
+            </a:r>
+            <a:r>
+              <a:rPr lang="cs-CZ" baseline="0" dirty="0" smtClean="0"/>
+              <a:t> seřazení  neuspořádaného pole </a:t>
+            </a:r>
+            <a:r>
+              <a:rPr lang="cs-CZ" baseline="0" dirty="0" smtClean="0"/>
+              <a:t>&lt; </a:t>
+            </a:r>
+            <a:r>
+              <a:rPr lang="cs-CZ" dirty="0" smtClean="0"/>
+              <a:t>čas na</a:t>
+            </a:r>
+            <a:r>
+              <a:rPr lang="cs-CZ" baseline="0" dirty="0" smtClean="0"/>
+              <a:t> seřazení již seřazeného pole, ale OPAČNĚ(od </a:t>
+            </a:r>
+            <a:r>
+              <a:rPr lang="cs-CZ" baseline="0" dirty="0" err="1" smtClean="0"/>
+              <a:t>max</a:t>
+            </a:r>
+            <a:r>
+              <a:rPr lang="cs-CZ" baseline="0" dirty="0" smtClean="0"/>
+              <a:t> po min)</a:t>
+            </a:r>
+            <a:r>
+              <a:rPr lang="cs-CZ" dirty="0" smtClean="0"/>
+              <a:t> </a:t>
+            </a:r>
+            <a:r>
+              <a:rPr lang="cs-CZ" dirty="0" smtClean="0"/>
+              <a:t>!!! </a:t>
+            </a:r>
+            <a:r>
+              <a:rPr lang="cs-CZ" dirty="0" smtClean="0"/>
+              <a:t>Dalším </a:t>
+            </a:r>
+            <a:r>
+              <a:rPr lang="cs-CZ" dirty="0" smtClean="0"/>
+              <a:t>algoritmem, který jsme měli implementovat byl </a:t>
             </a:r>
             <a:r>
               <a:rPr lang="cs-CZ" dirty="0" err="1" smtClean="0"/>
@@ -1867,7 +2111,7 @@
           <a:p>
             <a:fld id="{95EC1D4A-A796-47C3-A63E-CE236FB377E2}" type="datetimeFigureOut">
               <a:rPr lang="cs-CZ" smtClean="0"/>
-              <a:t>13.12.2016</a:t>
+              <a:t>14.12.2016</a:t>
             </a:fld>
             <a:endParaRPr lang="cs-CZ"/>
           </a:p>
@@ -2032,7 +2276,7 @@
           <a:p>
             <a:fld id="{95EC1D4A-A796-47C3-A63E-CE236FB377E2}" type="datetimeFigureOut">
               <a:rPr lang="cs-CZ" smtClean="0"/>
-              <a:t>13.12.2016</a:t>
+              <a:t>14.12.2016</a:t>
             </a:fld>
             <a:endParaRPr lang="cs-CZ"/>
           </a:p>
@@ -2207,7 +2451,7 @@
           <a:p>
             <a:fld id="{95EC1D4A-A796-47C3-A63E-CE236FB377E2}" type="datetimeFigureOut">
               <a:rPr lang="cs-CZ" smtClean="0"/>
-              <a:t>13.12.2016</a:t>
+              <a:t>14.12.2016</a:t>
             </a:fld>
             <a:endParaRPr lang="cs-CZ"/>
           </a:p>
@@ -2372,7 +2616,7 @@
           <a:p>
             <a:fld id="{95EC1D4A-A796-47C3-A63E-CE236FB377E2}" type="datetimeFigureOut">
               <a:rPr lang="cs-CZ" smtClean="0"/>
-              <a:t>13.12.2016</a:t>
+              <a:t>14.12.2016</a:t>
             </a:fld>
             <a:endParaRPr lang="cs-CZ"/>
           </a:p>
@@ -2613,7 +2857,7 @@
           <a:p>
             <a:fld id="{95EC1D4A-A796-47C3-A63E-CE236FB377E2}" type="datetimeFigureOut">
               <a:rPr lang="cs-CZ" smtClean="0"/>
-              <a:t>13.12.2016</a:t>
+              <a:t>14.12.2016</a:t>
             </a:fld>
             <a:endParaRPr lang="cs-CZ"/>
           </a:p>
@@ -2896,7 +3140,7 @@
           <a:p>
             <a:fld id="{95EC1D4A-A796-47C3-A63E-CE236FB377E2}" type="datetimeFigureOut">
               <a:rPr lang="cs-CZ" smtClean="0"/>
-              <a:t>13.12.2016</a:t>
+              <a:t>14.12.2016</a:t>
             </a:fld>
             <a:endParaRPr lang="cs-CZ"/>
           </a:p>
@@ -3313,7 +3557,7 @@
           <a:p>
             <a:fld id="{95EC1D4A-A796-47C3-A63E-CE236FB377E2}" type="datetimeFigureOut">
               <a:rPr lang="cs-CZ" smtClean="0"/>
-              <a:t>13.12.2016</a:t>
+              <a:t>14.12.2016</a:t>
             </a:fld>
             <a:endParaRPr lang="cs-CZ"/>
           </a:p>
@@ -3426,7 +3670,7 @@
           <a:p>
             <a:fld id="{95EC1D4A-A796-47C3-A63E-CE236FB377E2}" type="datetimeFigureOut">
               <a:rPr lang="cs-CZ" smtClean="0"/>
-              <a:t>13.12.2016</a:t>
+              <a:t>14.12.2016</a:t>
             </a:fld>
             <a:endParaRPr lang="cs-CZ"/>
           </a:p>
@@ -3516,7 +3760,7 @@
           <a:p>
             <a:fld id="{95EC1D4A-A796-47C3-A63E-CE236FB377E2}" type="datetimeFigureOut">
               <a:rPr lang="cs-CZ" smtClean="0"/>
-              <a:t>13.12.2016</a:t>
+              <a:t>14.12.2016</a:t>
             </a:fld>
             <a:endParaRPr lang="cs-CZ"/>
           </a:p>
@@ -3788,7 +4032,7 @@
           <a:p>
             <a:fld id="{95EC1D4A-A796-47C3-A63E-CE236FB377E2}" type="datetimeFigureOut">
               <a:rPr lang="cs-CZ" smtClean="0"/>
-              <a:t>13.12.2016</a:t>
+              <a:t>14.12.2016</a:t>
             </a:fld>
             <a:endParaRPr lang="cs-CZ"/>
           </a:p>
@@ -4036,7 +4280,7 @@
           <a:p>
             <a:fld id="{95EC1D4A-A796-47C3-A63E-CE236FB377E2}" type="datetimeFigureOut">
               <a:rPr lang="cs-CZ" smtClean="0"/>
-              <a:t>13.12.2016</a:t>
+              <a:t>14.12.2016</a:t>
             </a:fld>
             <a:endParaRPr lang="cs-CZ"/>
           </a:p>
@@ -4244,7 +4488,7 @@
           <a:p>
             <a:fld id="{95EC1D4A-A796-47C3-A63E-CE236FB377E2}" type="datetimeFigureOut">
               <a:rPr lang="cs-CZ" smtClean="0"/>
-              <a:t>13.12.2016</a:t>
+              <a:t>14.12.2016</a:t>
             </a:fld>
             <a:endParaRPr lang="cs-CZ"/>
           </a:p>
@@ -5688,11 +5932,7 @@
           <a:p>
             <a:r>
               <a:rPr lang="cs-CZ" dirty="0" smtClean="0"/>
-              <a:t>vyhledávání </a:t>
-            </a:r>
-            <a:r>
-              <a:rPr lang="cs-CZ" dirty="0" smtClean="0"/>
-              <a:t>podřetězce v řetězci</a:t>
+              <a:t>vyhledávání podřetězce v řetězci</a:t>
             </a:r>
           </a:p>
           <a:p>

</xml_diff>